<commit_message>
Complete the project v2.0 - With the fix of text. - More error catching. - Use phone number instead of ID
Signed-off-by: Steven <phatptce130319@fpt.edu.vn>
</commit_message>
<xml_diff>
--- a/PRJ311_SE1301_AS2_Group6.pptx
+++ b/PRJ311_SE1301_AS2_Group6.pptx
@@ -211,7 +211,7 @@
           <a:p>
             <a:fld id="{C2195869-5BB7-4726-816F-472DF05B3ADC}" type="datetimeFigureOut">
               <a:rPr lang="en-US" smtClean="0"/>
-              <a:t>3/24/2019</a:t>
+              <a:t>3/31/2019</a:t>
             </a:fld>
             <a:endParaRPr lang="en-US"/>
           </a:p>
@@ -275,38 +275,37 @@
           <a:p>
             <a:pPr lvl="0"/>
             <a:r>
-              <a:rPr lang="en-US" smtClean="0"/>
+              <a:rPr lang="en-US"/>
               <a:t>Edit Master text styles</a:t>
             </a:r>
           </a:p>
           <a:p>
             <a:pPr lvl="1"/>
             <a:r>
-              <a:rPr lang="en-US" smtClean="0"/>
+              <a:rPr lang="en-US"/>
               <a:t>Second level</a:t>
             </a:r>
           </a:p>
           <a:p>
             <a:pPr lvl="2"/>
             <a:r>
-              <a:rPr lang="en-US" smtClean="0"/>
+              <a:rPr lang="en-US"/>
               <a:t>Third level</a:t>
             </a:r>
           </a:p>
           <a:p>
             <a:pPr lvl="3"/>
             <a:r>
-              <a:rPr lang="en-US" smtClean="0"/>
+              <a:rPr lang="en-US"/>
               <a:t>Fourth level</a:t>
             </a:r>
           </a:p>
           <a:p>
             <a:pPr lvl="4"/>
             <a:r>
-              <a:rPr lang="en-US" smtClean="0"/>
+              <a:rPr lang="en-US"/>
               <a:t>Fifth level</a:t>
             </a:r>
-            <a:endParaRPr lang="en-US"/>
           </a:p>
         </p:txBody>
       </p:sp>
@@ -1141,7 +1140,7 @@
           </a:lstStyle>
           <a:p>
             <a:r>
-              <a:rPr lang="en-US" smtClean="0"/>
+              <a:rPr lang="en-US"/>
               <a:t>Click to edit Master title style</a:t>
             </a:r>
             <a:endParaRPr lang="en-US" dirty="0"/>
@@ -1261,7 +1260,7 @@
           </a:lstStyle>
           <a:p>
             <a:r>
-              <a:rPr lang="en-US" smtClean="0"/>
+              <a:rPr lang="en-US"/>
               <a:t>Click to edit Master subtitle style</a:t>
             </a:r>
             <a:endParaRPr lang="en-US" dirty="0"/>
@@ -1286,7 +1285,7 @@
             <a:fld id="{B61BEF0D-F0BB-DE4B-95CE-6DB70DBA9567}" type="datetimeFigureOut">
               <a:rPr lang="en-US" smtClean="0"/>
               <a:pPr/>
-              <a:t>3/24/2019</a:t>
+              <a:t>3/31/2019</a:t>
             </a:fld>
             <a:endParaRPr lang="en-US" dirty="0"/>
           </a:p>
@@ -1392,7 +1391,7 @@
           </a:lstStyle>
           <a:p>
             <a:r>
-              <a:rPr lang="en-US" smtClean="0"/>
+              <a:rPr lang="en-US"/>
               <a:t>Click to edit Master title style</a:t>
             </a:r>
             <a:endParaRPr lang="en-US" dirty="0"/>
@@ -1515,7 +1514,7 @@
           <a:p>
             <a:pPr lvl="0"/>
             <a:r>
-              <a:rPr lang="en-US" smtClean="0"/>
+              <a:rPr lang="en-US"/>
               <a:t>Edit Master text styles</a:t>
             </a:r>
           </a:p>
@@ -1539,7 +1538,7 @@
             <a:fld id="{B61BEF0D-F0BB-DE4B-95CE-6DB70DBA9567}" type="datetimeFigureOut">
               <a:rPr lang="en-US" smtClean="0"/>
               <a:pPr/>
-              <a:t>3/24/2019</a:t>
+              <a:t>3/31/2019</a:t>
             </a:fld>
             <a:endParaRPr lang="en-US" dirty="0"/>
           </a:p>
@@ -1645,7 +1644,7 @@
           </a:lstStyle>
           <a:p>
             <a:r>
-              <a:rPr lang="en-US" smtClean="0"/>
+              <a:rPr lang="en-US"/>
               <a:t>Click to edit Master title style</a:t>
             </a:r>
             <a:endParaRPr lang="en-US" dirty="0"/>
@@ -1709,7 +1708,7 @@
           <a:p>
             <a:pPr lvl="0"/>
             <a:r>
-              <a:rPr lang="en-US" smtClean="0"/>
+              <a:rPr lang="en-US"/>
               <a:t>Edit Master text styles</a:t>
             </a:r>
           </a:p>
@@ -1831,7 +1830,7 @@
           <a:p>
             <a:pPr lvl="0"/>
             <a:r>
-              <a:rPr lang="en-US" smtClean="0"/>
+              <a:rPr lang="en-US"/>
               <a:t>Edit Master text styles</a:t>
             </a:r>
           </a:p>
@@ -1855,7 +1854,7 @@
             <a:fld id="{B61BEF0D-F0BB-DE4B-95CE-6DB70DBA9567}" type="datetimeFigureOut">
               <a:rPr lang="en-US" smtClean="0"/>
               <a:pPr/>
-              <a:t>3/24/2019</a:t>
+              <a:t>3/31/2019</a:t>
             </a:fld>
             <a:endParaRPr lang="en-US" dirty="0"/>
           </a:p>
@@ -2051,7 +2050,7 @@
           </a:lstStyle>
           <a:p>
             <a:r>
-              <a:rPr lang="en-US" smtClean="0"/>
+              <a:rPr lang="en-US"/>
               <a:t>Click to edit Master title style</a:t>
             </a:r>
             <a:endParaRPr lang="en-US" dirty="0"/>
@@ -2174,7 +2173,7 @@
           <a:p>
             <a:pPr lvl="0"/>
             <a:r>
-              <a:rPr lang="en-US" smtClean="0"/>
+              <a:rPr lang="en-US"/>
               <a:t>Edit Master text styles</a:t>
             </a:r>
           </a:p>
@@ -2198,7 +2197,7 @@
             <a:fld id="{B61BEF0D-F0BB-DE4B-95CE-6DB70DBA9567}" type="datetimeFigureOut">
               <a:rPr lang="en-US" smtClean="0"/>
               <a:pPr/>
-              <a:t>3/24/2019</a:t>
+              <a:t>3/31/2019</a:t>
             </a:fld>
             <a:endParaRPr lang="en-US" dirty="0"/>
           </a:p>
@@ -2304,7 +2303,7 @@
           </a:lstStyle>
           <a:p>
             <a:r>
-              <a:rPr lang="en-US" smtClean="0"/>
+              <a:rPr lang="en-US"/>
               <a:t>Click to edit Master title style</a:t>
             </a:r>
             <a:endParaRPr lang="en-US" dirty="0"/>
@@ -2368,7 +2367,7 @@
           <a:p>
             <a:pPr lvl="0"/>
             <a:r>
-              <a:rPr lang="en-US" smtClean="0"/>
+              <a:rPr lang="en-US"/>
               <a:t>Edit Master text styles</a:t>
             </a:r>
           </a:p>
@@ -2490,7 +2489,7 @@
           <a:p>
             <a:pPr lvl="0"/>
             <a:r>
-              <a:rPr lang="en-US" smtClean="0"/>
+              <a:rPr lang="en-US"/>
               <a:t>Edit Master text styles</a:t>
             </a:r>
           </a:p>
@@ -2514,7 +2513,7 @@
             <a:fld id="{B61BEF0D-F0BB-DE4B-95CE-6DB70DBA9567}" type="datetimeFigureOut">
               <a:rPr lang="en-US" smtClean="0"/>
               <a:pPr/>
-              <a:t>3/24/2019</a:t>
+              <a:t>3/31/2019</a:t>
             </a:fld>
             <a:endParaRPr lang="en-US" dirty="0"/>
           </a:p>
@@ -2702,7 +2701,7 @@
           </a:lstStyle>
           <a:p>
             <a:r>
-              <a:rPr lang="en-US" smtClean="0"/>
+              <a:rPr lang="en-US"/>
               <a:t>Click to edit Master title style</a:t>
             </a:r>
             <a:endParaRPr lang="en-US" dirty="0"/>
@@ -2763,7 +2762,7 @@
           <a:p>
             <a:pPr lvl="0"/>
             <a:r>
-              <a:rPr lang="en-US" smtClean="0"/>
+              <a:rPr lang="en-US"/>
               <a:t>Edit Master text styles</a:t>
             </a:r>
           </a:p>
@@ -2885,7 +2884,7 @@
           <a:p>
             <a:pPr lvl="0"/>
             <a:r>
-              <a:rPr lang="en-US" smtClean="0"/>
+              <a:rPr lang="en-US"/>
               <a:t>Edit Master text styles</a:t>
             </a:r>
           </a:p>
@@ -2909,7 +2908,7 @@
             <a:fld id="{B61BEF0D-F0BB-DE4B-95CE-6DB70DBA9567}" type="datetimeFigureOut">
               <a:rPr lang="en-US" smtClean="0"/>
               <a:pPr/>
-              <a:t>3/24/2019</a:t>
+              <a:t>3/31/2019</a:t>
             </a:fld>
             <a:endParaRPr lang="en-US" dirty="0"/>
           </a:p>
@@ -3004,7 +3003,7 @@
           <a:lstStyle/>
           <a:p>
             <a:r>
-              <a:rPr lang="en-US" smtClean="0"/>
+              <a:rPr lang="en-US"/>
               <a:t>Click to edit Master title style</a:t>
             </a:r>
             <a:endParaRPr lang="en-US" dirty="0"/>
@@ -3028,35 +3027,35 @@
           <a:p>
             <a:pPr lvl="0"/>
             <a:r>
-              <a:rPr lang="en-US" smtClean="0"/>
+              <a:rPr lang="en-US"/>
               <a:t>Edit Master text styles</a:t>
             </a:r>
           </a:p>
           <a:p>
             <a:pPr lvl="1"/>
             <a:r>
-              <a:rPr lang="en-US" smtClean="0"/>
+              <a:rPr lang="en-US"/>
               <a:t>Second level</a:t>
             </a:r>
           </a:p>
           <a:p>
             <a:pPr lvl="2"/>
             <a:r>
-              <a:rPr lang="en-US" smtClean="0"/>
+              <a:rPr lang="en-US"/>
               <a:t>Third level</a:t>
             </a:r>
           </a:p>
           <a:p>
             <a:pPr lvl="3"/>
             <a:r>
-              <a:rPr lang="en-US" smtClean="0"/>
+              <a:rPr lang="en-US"/>
               <a:t>Fourth level</a:t>
             </a:r>
           </a:p>
           <a:p>
             <a:pPr lvl="4"/>
             <a:r>
-              <a:rPr lang="en-US" smtClean="0"/>
+              <a:rPr lang="en-US"/>
               <a:t>Fifth level</a:t>
             </a:r>
             <a:endParaRPr lang="en-US" dirty="0"/>
@@ -3081,7 +3080,7 @@
             <a:fld id="{B61BEF0D-F0BB-DE4B-95CE-6DB70DBA9567}" type="datetimeFigureOut">
               <a:rPr lang="en-US" smtClean="0"/>
               <a:pPr/>
-              <a:t>3/24/2019</a:t>
+              <a:t>3/31/2019</a:t>
             </a:fld>
             <a:endParaRPr lang="en-US" dirty="0"/>
           </a:p>
@@ -3181,7 +3180,7 @@
           <a:lstStyle/>
           <a:p>
             <a:r>
-              <a:rPr lang="en-US" smtClean="0"/>
+              <a:rPr lang="en-US"/>
               <a:t>Click to edit Master title style</a:t>
             </a:r>
             <a:endParaRPr lang="en-US" dirty="0"/>
@@ -3210,35 +3209,35 @@
           <a:p>
             <a:pPr lvl="0"/>
             <a:r>
-              <a:rPr lang="en-US" smtClean="0"/>
+              <a:rPr lang="en-US"/>
               <a:t>Edit Master text styles</a:t>
             </a:r>
           </a:p>
           <a:p>
             <a:pPr lvl="1"/>
             <a:r>
-              <a:rPr lang="en-US" smtClean="0"/>
+              <a:rPr lang="en-US"/>
               <a:t>Second level</a:t>
             </a:r>
           </a:p>
           <a:p>
             <a:pPr lvl="2"/>
             <a:r>
-              <a:rPr lang="en-US" smtClean="0"/>
+              <a:rPr lang="en-US"/>
               <a:t>Third level</a:t>
             </a:r>
           </a:p>
           <a:p>
             <a:pPr lvl="3"/>
             <a:r>
-              <a:rPr lang="en-US" smtClean="0"/>
+              <a:rPr lang="en-US"/>
               <a:t>Fourth level</a:t>
             </a:r>
           </a:p>
           <a:p>
             <a:pPr lvl="4"/>
             <a:r>
-              <a:rPr lang="en-US" smtClean="0"/>
+              <a:rPr lang="en-US"/>
               <a:t>Fifth level</a:t>
             </a:r>
             <a:endParaRPr lang="en-US" dirty="0"/>
@@ -3263,7 +3262,7 @@
             <a:fld id="{B61BEF0D-F0BB-DE4B-95CE-6DB70DBA9567}" type="datetimeFigureOut">
               <a:rPr lang="en-US" smtClean="0"/>
               <a:pPr/>
-              <a:t>3/24/2019</a:t>
+              <a:t>3/31/2019</a:t>
             </a:fld>
             <a:endParaRPr lang="en-US" dirty="0"/>
           </a:p>
@@ -3364,7 +3363,7 @@
           </a:lstStyle>
           <a:p>
             <a:r>
-              <a:rPr lang="en-US" smtClean="0"/>
+              <a:rPr lang="en-US"/>
               <a:t>Click to edit Master title style</a:t>
             </a:r>
             <a:endParaRPr lang="en-US" dirty="0"/>
@@ -3388,35 +3387,35 @@
           <a:p>
             <a:pPr lvl="0"/>
             <a:r>
-              <a:rPr lang="en-US" smtClean="0"/>
+              <a:rPr lang="en-US"/>
               <a:t>Edit Master text styles</a:t>
             </a:r>
           </a:p>
           <a:p>
             <a:pPr lvl="1"/>
             <a:r>
-              <a:rPr lang="en-US" smtClean="0"/>
+              <a:rPr lang="en-US"/>
               <a:t>Second level</a:t>
             </a:r>
           </a:p>
           <a:p>
             <a:pPr lvl="2"/>
             <a:r>
-              <a:rPr lang="en-US" smtClean="0"/>
+              <a:rPr lang="en-US"/>
               <a:t>Third level</a:t>
             </a:r>
           </a:p>
           <a:p>
             <a:pPr lvl="3"/>
             <a:r>
-              <a:rPr lang="en-US" smtClean="0"/>
+              <a:rPr lang="en-US"/>
               <a:t>Fourth level</a:t>
             </a:r>
           </a:p>
           <a:p>
             <a:pPr lvl="4"/>
             <a:r>
-              <a:rPr lang="en-US" smtClean="0"/>
+              <a:rPr lang="en-US"/>
               <a:t>Fifth level</a:t>
             </a:r>
             <a:endParaRPr lang="en-US" dirty="0"/>
@@ -3441,7 +3440,7 @@
             <a:fld id="{B61BEF0D-F0BB-DE4B-95CE-6DB70DBA9567}" type="datetimeFigureOut">
               <a:rPr lang="en-US" smtClean="0"/>
               <a:pPr/>
-              <a:t>3/24/2019</a:t>
+              <a:t>3/31/2019</a:t>
             </a:fld>
             <a:endParaRPr lang="en-US" dirty="0"/>
           </a:p>
@@ -3545,7 +3544,7 @@
           </a:lstStyle>
           <a:p>
             <a:r>
-              <a:rPr lang="en-US" smtClean="0"/>
+              <a:rPr lang="en-US"/>
               <a:t>Click to edit Master title style</a:t>
             </a:r>
             <a:endParaRPr lang="en-US" dirty="0"/>
@@ -3666,7 +3665,7 @@
           <a:p>
             <a:pPr lvl="0"/>
             <a:r>
-              <a:rPr lang="en-US" smtClean="0"/>
+              <a:rPr lang="en-US"/>
               <a:t>Edit Master text styles</a:t>
             </a:r>
           </a:p>
@@ -3690,7 +3689,7 @@
             <a:fld id="{B61BEF0D-F0BB-DE4B-95CE-6DB70DBA9567}" type="datetimeFigureOut">
               <a:rPr lang="en-US" smtClean="0"/>
               <a:pPr/>
-              <a:t>3/24/2019</a:t>
+              <a:t>3/31/2019</a:t>
             </a:fld>
             <a:endParaRPr lang="en-US" dirty="0"/>
           </a:p>
@@ -3785,7 +3784,7 @@
           <a:lstStyle/>
           <a:p>
             <a:r>
-              <a:rPr lang="en-US" smtClean="0"/>
+              <a:rPr lang="en-US"/>
               <a:t>Click to edit Master title style</a:t>
             </a:r>
             <a:endParaRPr lang="en-US" dirty="0"/>
@@ -3814,35 +3813,35 @@
           <a:p>
             <a:pPr lvl="0"/>
             <a:r>
-              <a:rPr lang="en-US" smtClean="0"/>
+              <a:rPr lang="en-US"/>
               <a:t>Edit Master text styles</a:t>
             </a:r>
           </a:p>
           <a:p>
             <a:pPr lvl="1"/>
             <a:r>
-              <a:rPr lang="en-US" smtClean="0"/>
+              <a:rPr lang="en-US"/>
               <a:t>Second level</a:t>
             </a:r>
           </a:p>
           <a:p>
             <a:pPr lvl="2"/>
             <a:r>
-              <a:rPr lang="en-US" smtClean="0"/>
+              <a:rPr lang="en-US"/>
               <a:t>Third level</a:t>
             </a:r>
           </a:p>
           <a:p>
             <a:pPr lvl="3"/>
             <a:r>
-              <a:rPr lang="en-US" smtClean="0"/>
+              <a:rPr lang="en-US"/>
               <a:t>Fourth level</a:t>
             </a:r>
           </a:p>
           <a:p>
             <a:pPr lvl="4"/>
             <a:r>
-              <a:rPr lang="en-US" smtClean="0"/>
+              <a:rPr lang="en-US"/>
               <a:t>Fifth level</a:t>
             </a:r>
             <a:endParaRPr lang="en-US" dirty="0"/>
@@ -3871,35 +3870,35 @@
           <a:p>
             <a:pPr lvl="0"/>
             <a:r>
-              <a:rPr lang="en-US" smtClean="0"/>
+              <a:rPr lang="en-US"/>
               <a:t>Edit Master text styles</a:t>
             </a:r>
           </a:p>
           <a:p>
             <a:pPr lvl="1"/>
             <a:r>
-              <a:rPr lang="en-US" smtClean="0"/>
+              <a:rPr lang="en-US"/>
               <a:t>Second level</a:t>
             </a:r>
           </a:p>
           <a:p>
             <a:pPr lvl="2"/>
             <a:r>
-              <a:rPr lang="en-US" smtClean="0"/>
+              <a:rPr lang="en-US"/>
               <a:t>Third level</a:t>
             </a:r>
           </a:p>
           <a:p>
             <a:pPr lvl="3"/>
             <a:r>
-              <a:rPr lang="en-US" smtClean="0"/>
+              <a:rPr lang="en-US"/>
               <a:t>Fourth level</a:t>
             </a:r>
           </a:p>
           <a:p>
             <a:pPr lvl="4"/>
             <a:r>
-              <a:rPr lang="en-US" smtClean="0"/>
+              <a:rPr lang="en-US"/>
               <a:t>Fifth level</a:t>
             </a:r>
             <a:endParaRPr lang="en-US" dirty="0"/>
@@ -3924,7 +3923,7 @@
             <a:fld id="{B61BEF0D-F0BB-DE4B-95CE-6DB70DBA9567}" type="datetimeFigureOut">
               <a:rPr lang="en-US" smtClean="0"/>
               <a:pPr/>
-              <a:t>3/24/2019</a:t>
+              <a:t>3/31/2019</a:t>
             </a:fld>
             <a:endParaRPr lang="en-US" dirty="0"/>
           </a:p>
@@ -4023,7 +4022,7 @@
           </a:lstStyle>
           <a:p>
             <a:r>
-              <a:rPr lang="en-US" smtClean="0"/>
+              <a:rPr lang="en-US"/>
               <a:t>Click to edit Master title style</a:t>
             </a:r>
             <a:endParaRPr lang="en-US" dirty="0"/>
@@ -4091,7 +4090,7 @@
           <a:p>
             <a:pPr lvl="0"/>
             <a:r>
-              <a:rPr lang="en-US" smtClean="0"/>
+              <a:rPr lang="en-US"/>
               <a:t>Edit Master text styles</a:t>
             </a:r>
           </a:p>
@@ -4121,35 +4120,35 @@
           <a:p>
             <a:pPr lvl="0"/>
             <a:r>
-              <a:rPr lang="en-US" smtClean="0"/>
+              <a:rPr lang="en-US"/>
               <a:t>Edit Master text styles</a:t>
             </a:r>
           </a:p>
           <a:p>
             <a:pPr lvl="1"/>
             <a:r>
-              <a:rPr lang="en-US" smtClean="0"/>
+              <a:rPr lang="en-US"/>
               <a:t>Second level</a:t>
             </a:r>
           </a:p>
           <a:p>
             <a:pPr lvl="2"/>
             <a:r>
-              <a:rPr lang="en-US" smtClean="0"/>
+              <a:rPr lang="en-US"/>
               <a:t>Third level</a:t>
             </a:r>
           </a:p>
           <a:p>
             <a:pPr lvl="3"/>
             <a:r>
-              <a:rPr lang="en-US" smtClean="0"/>
+              <a:rPr lang="en-US"/>
               <a:t>Fourth level</a:t>
             </a:r>
           </a:p>
           <a:p>
             <a:pPr lvl="4"/>
             <a:r>
-              <a:rPr lang="en-US" smtClean="0"/>
+              <a:rPr lang="en-US"/>
               <a:t>Fifth level</a:t>
             </a:r>
             <a:endParaRPr lang="en-US" dirty="0"/>
@@ -4217,7 +4216,7 @@
           <a:p>
             <a:pPr lvl="0"/>
             <a:r>
-              <a:rPr lang="en-US" smtClean="0"/>
+              <a:rPr lang="en-US"/>
               <a:t>Edit Master text styles</a:t>
             </a:r>
           </a:p>
@@ -4247,35 +4246,35 @@
           <a:p>
             <a:pPr lvl="0"/>
             <a:r>
-              <a:rPr lang="en-US" smtClean="0"/>
+              <a:rPr lang="en-US"/>
               <a:t>Edit Master text styles</a:t>
             </a:r>
           </a:p>
           <a:p>
             <a:pPr lvl="1"/>
             <a:r>
-              <a:rPr lang="en-US" smtClean="0"/>
+              <a:rPr lang="en-US"/>
               <a:t>Second level</a:t>
             </a:r>
           </a:p>
           <a:p>
             <a:pPr lvl="2"/>
             <a:r>
-              <a:rPr lang="en-US" smtClean="0"/>
+              <a:rPr lang="en-US"/>
               <a:t>Third level</a:t>
             </a:r>
           </a:p>
           <a:p>
             <a:pPr lvl="3"/>
             <a:r>
-              <a:rPr lang="en-US" smtClean="0"/>
+              <a:rPr lang="en-US"/>
               <a:t>Fourth level</a:t>
             </a:r>
           </a:p>
           <a:p>
             <a:pPr lvl="4"/>
             <a:r>
-              <a:rPr lang="en-US" smtClean="0"/>
+              <a:rPr lang="en-US"/>
               <a:t>Fifth level</a:t>
             </a:r>
             <a:endParaRPr lang="en-US" dirty="0"/>
@@ -4300,7 +4299,7 @@
             <a:fld id="{B61BEF0D-F0BB-DE4B-95CE-6DB70DBA9567}" type="datetimeFigureOut">
               <a:rPr lang="en-US" smtClean="0"/>
               <a:pPr/>
-              <a:t>3/24/2019</a:t>
+              <a:t>3/31/2019</a:t>
             </a:fld>
             <a:endParaRPr lang="en-US" dirty="0"/>
           </a:p>
@@ -4400,7 +4399,7 @@
           <a:lstStyle/>
           <a:p>
             <a:r>
-              <a:rPr lang="en-US" smtClean="0"/>
+              <a:rPr lang="en-US"/>
               <a:t>Click to edit Master title style</a:t>
             </a:r>
             <a:endParaRPr lang="en-US" dirty="0"/>
@@ -4425,7 +4424,7 @@
             <a:fld id="{B61BEF0D-F0BB-DE4B-95CE-6DB70DBA9567}" type="datetimeFigureOut">
               <a:rPr lang="en-US" smtClean="0"/>
               <a:pPr/>
-              <a:t>3/24/2019</a:t>
+              <a:t>3/31/2019</a:t>
             </a:fld>
             <a:endParaRPr lang="en-US" dirty="0"/>
           </a:p>
@@ -4522,7 +4521,7 @@
             <a:fld id="{B61BEF0D-F0BB-DE4B-95CE-6DB70DBA9567}" type="datetimeFigureOut">
               <a:rPr lang="en-US" smtClean="0"/>
               <a:pPr/>
-              <a:t>3/24/2019</a:t>
+              <a:t>3/31/2019</a:t>
             </a:fld>
             <a:endParaRPr lang="en-US" dirty="0"/>
           </a:p>
@@ -4628,7 +4627,7 @@
           </a:lstStyle>
           <a:p>
             <a:r>
-              <a:rPr lang="en-US" smtClean="0"/>
+              <a:rPr lang="en-US"/>
               <a:t>Click to edit Master title style</a:t>
             </a:r>
             <a:endParaRPr lang="en-US" dirty="0"/>
@@ -4659,35 +4658,35 @@
           <a:p>
             <a:pPr lvl="0"/>
             <a:r>
-              <a:rPr lang="en-US" smtClean="0"/>
+              <a:rPr lang="en-US"/>
               <a:t>Edit Master text styles</a:t>
             </a:r>
           </a:p>
           <a:p>
             <a:pPr lvl="1"/>
             <a:r>
-              <a:rPr lang="en-US" smtClean="0"/>
+              <a:rPr lang="en-US"/>
               <a:t>Second level</a:t>
             </a:r>
           </a:p>
           <a:p>
             <a:pPr lvl="2"/>
             <a:r>
-              <a:rPr lang="en-US" smtClean="0"/>
+              <a:rPr lang="en-US"/>
               <a:t>Third level</a:t>
             </a:r>
           </a:p>
           <a:p>
             <a:pPr lvl="3"/>
             <a:r>
-              <a:rPr lang="en-US" smtClean="0"/>
+              <a:rPr lang="en-US"/>
               <a:t>Fourth level</a:t>
             </a:r>
           </a:p>
           <a:p>
             <a:pPr lvl="4"/>
             <a:r>
-              <a:rPr lang="en-US" smtClean="0"/>
+              <a:rPr lang="en-US"/>
               <a:t>Fifth level</a:t>
             </a:r>
             <a:endParaRPr lang="en-US" dirty="0"/>
@@ -4755,7 +4754,7 @@
           <a:p>
             <a:pPr lvl="0"/>
             <a:r>
-              <a:rPr lang="en-US" smtClean="0"/>
+              <a:rPr lang="en-US"/>
               <a:t>Edit Master text styles</a:t>
             </a:r>
           </a:p>
@@ -4779,7 +4778,7 @@
             <a:fld id="{B61BEF0D-F0BB-DE4B-95CE-6DB70DBA9567}" type="datetimeFigureOut">
               <a:rPr lang="en-US" smtClean="0"/>
               <a:pPr/>
-              <a:t>3/24/2019</a:t>
+              <a:t>3/31/2019</a:t>
             </a:fld>
             <a:endParaRPr lang="en-US" dirty="0"/>
           </a:p>
@@ -4885,7 +4884,7 @@
           </a:lstStyle>
           <a:p>
             <a:r>
-              <a:rPr lang="en-US" smtClean="0"/>
+              <a:rPr lang="en-US"/>
               <a:t>Click to edit Master title style</a:t>
             </a:r>
             <a:endParaRPr lang="en-US" dirty="0"/>
@@ -4952,7 +4951,7 @@
           </a:lstStyle>
           <a:p>
             <a:r>
-              <a:rPr lang="en-US" smtClean="0"/>
+              <a:rPr lang="en-US"/>
               <a:t>Click icon to add picture</a:t>
             </a:r>
             <a:endParaRPr lang="en-US" dirty="0"/>
@@ -5020,7 +5019,7 @@
           <a:p>
             <a:pPr lvl="0"/>
             <a:r>
-              <a:rPr lang="en-US" smtClean="0"/>
+              <a:rPr lang="en-US"/>
               <a:t>Edit Master text styles</a:t>
             </a:r>
           </a:p>
@@ -5044,7 +5043,7 @@
             <a:fld id="{B61BEF0D-F0BB-DE4B-95CE-6DB70DBA9567}" type="datetimeFigureOut">
               <a:rPr lang="en-US" smtClean="0"/>
               <a:pPr/>
-              <a:t>3/24/2019</a:t>
+              <a:t>3/31/2019</a:t>
             </a:fld>
             <a:endParaRPr lang="en-US" dirty="0"/>
           </a:p>
@@ -5684,7 +5683,7 @@
           <a:lstStyle/>
           <a:p>
             <a:r>
-              <a:rPr lang="en-US" smtClean="0"/>
+              <a:rPr lang="en-US"/>
               <a:t>Click to edit Master title style</a:t>
             </a:r>
             <a:endParaRPr lang="en-US" dirty="0"/>
@@ -5718,35 +5717,35 @@
           <a:p>
             <a:pPr lvl="0"/>
             <a:r>
-              <a:rPr lang="en-US" smtClean="0"/>
+              <a:rPr lang="en-US"/>
               <a:t>Edit Master text styles</a:t>
             </a:r>
           </a:p>
           <a:p>
             <a:pPr lvl="1"/>
             <a:r>
-              <a:rPr lang="en-US" smtClean="0"/>
+              <a:rPr lang="en-US"/>
               <a:t>Second level</a:t>
             </a:r>
           </a:p>
           <a:p>
             <a:pPr lvl="2"/>
             <a:r>
-              <a:rPr lang="en-US" smtClean="0"/>
+              <a:rPr lang="en-US"/>
               <a:t>Third level</a:t>
             </a:r>
           </a:p>
           <a:p>
             <a:pPr lvl="3"/>
             <a:r>
-              <a:rPr lang="en-US" smtClean="0"/>
+              <a:rPr lang="en-US"/>
               <a:t>Fourth level</a:t>
             </a:r>
           </a:p>
           <a:p>
             <a:pPr lvl="4"/>
             <a:r>
-              <a:rPr lang="en-US" smtClean="0"/>
+              <a:rPr lang="en-US"/>
               <a:t>Fifth level</a:t>
             </a:r>
             <a:endParaRPr lang="en-US" dirty="0"/>
@@ -5789,7 +5788,7 @@
             <a:fld id="{B61BEF0D-F0BB-DE4B-95CE-6DB70DBA9567}" type="datetimeFigureOut">
               <a:rPr lang="en-US" smtClean="0"/>
               <a:pPr/>
-              <a:t>3/24/2019</a:t>
+              <a:t>3/31/2019</a:t>
             </a:fld>
             <a:endParaRPr lang="en-US" dirty="0"/>
           </a:p>
@@ -6382,23 +6381,7 @@
                 <a:latin typeface="Times New Roman" panose="02020603050405020304" pitchFamily="18" charset="0"/>
                 <a:cs typeface="Times New Roman" panose="02020603050405020304" pitchFamily="18" charset="0"/>
               </a:rPr>
-              <a:t>Agricultural </a:t>
-            </a:r>
-            <a:r>
-              <a:rPr lang="en-US" b="1" i="1" dirty="0" smtClean="0">
-                <a:ln w="3175">
-                  <a:solidFill>
-                    <a:srgbClr val="00B050"/>
-                  </a:solidFill>
-                  <a:prstDash val="solid"/>
-                </a:ln>
-                <a:solidFill>
-                  <a:srgbClr val="92D050"/>
-                </a:solidFill>
-                <a:latin typeface="Times New Roman" panose="02020603050405020304" pitchFamily="18" charset="0"/>
-                <a:cs typeface="Times New Roman" panose="02020603050405020304" pitchFamily="18" charset="0"/>
-              </a:rPr>
-              <a:t>Product Management</a:t>
+              <a:t>Agricultural Product Management</a:t>
             </a:r>
             <a:endParaRPr lang="en-US" dirty="0">
               <a:ln w="3175">
@@ -6453,28 +6436,10 @@
                 <a:latin typeface="Times New Roman" panose="02020603050405020304" pitchFamily="18" charset="0"/>
                 <a:cs typeface="Times New Roman" panose="02020603050405020304" pitchFamily="18" charset="0"/>
               </a:rPr>
-              <a:t> </a:t>
-            </a:r>
-            <a:r>
-              <a:rPr lang="en-US" dirty="0" smtClean="0">
-                <a:ln w="0"/>
-                <a:solidFill>
-                  <a:schemeClr val="tx1"/>
-                </a:solidFill>
-                <a:effectLst>
-                  <a:outerShdw blurRad="38100" dist="19050" dir="2700000" algn="tl" rotWithShape="0">
-                    <a:schemeClr val="dk1">
-                      <a:alpha val="40000"/>
-                    </a:schemeClr>
-                  </a:outerShdw>
-                </a:effectLst>
-                <a:latin typeface="Times New Roman" panose="02020603050405020304" pitchFamily="18" charset="0"/>
-                <a:cs typeface="Times New Roman" panose="02020603050405020304" pitchFamily="18" charset="0"/>
-              </a:rPr>
-              <a:t>      </a:t>
-            </a:r>
-            <a:r>
-              <a:rPr lang="en-US" sz="4400" b="1" dirty="0" smtClean="0">
+              <a:t>       </a:t>
+            </a:r>
+            <a:r>
+              <a:rPr lang="en-US" sz="4400" b="1" dirty="0">
                 <a:ln w="0"/>
                 <a:solidFill>
                   <a:schemeClr val="tx1"/>
@@ -6495,7 +6460,7 @@
           <a:p>
             <a:pPr lvl="1" algn="just"/>
             <a:r>
-              <a:rPr lang="en-US" sz="4400" b="1" dirty="0" smtClean="0">
+              <a:rPr lang="en-US" sz="4400" b="1" dirty="0">
                 <a:ln w="0"/>
                 <a:solidFill>
                   <a:schemeClr val="tx1"/>
@@ -6513,7 +6478,7 @@
               <a:t>Phan Tan Phat CE130319(</a:t>
             </a:r>
             <a:r>
-              <a:rPr lang="en-US" sz="4400" b="1" dirty="0" smtClean="0">
+              <a:rPr lang="en-US" sz="4400" b="1" dirty="0">
                 <a:ln w="0"/>
                 <a:solidFill>
                   <a:srgbClr val="FF0000"/>
@@ -6531,7 +6496,7 @@
               <a:t>*</a:t>
             </a:r>
             <a:r>
-              <a:rPr lang="en-US" sz="4400" b="1" dirty="0" smtClean="0">
+              <a:rPr lang="en-US" sz="4400" b="1" dirty="0">
                 <a:ln w="0"/>
                 <a:solidFill>
                   <a:schemeClr val="tx1"/>
@@ -6552,7 +6517,7 @@
           <a:p>
             <a:pPr lvl="1" algn="just"/>
             <a:r>
-              <a:rPr lang="en-US" sz="4400" b="1" dirty="0" smtClean="0">
+              <a:rPr lang="en-US" sz="4400" b="1" dirty="0">
                 <a:ln w="0"/>
                 <a:solidFill>
                   <a:schemeClr val="tx1"/>
@@ -6570,7 +6535,7 @@
               <a:t>Dang </a:t>
             </a:r>
             <a:r>
-              <a:rPr lang="en-US" sz="4400" b="1" dirty="0" err="1" smtClean="0">
+              <a:rPr lang="en-US" sz="4400" b="1" dirty="0" err="1">
                 <a:ln w="0"/>
                 <a:solidFill>
                   <a:schemeClr val="tx1"/>
@@ -6588,7 +6553,7 @@
               <a:t>Buu</a:t>
             </a:r>
             <a:r>
-              <a:rPr lang="en-US" sz="4400" b="1" dirty="0" smtClean="0">
+              <a:rPr lang="en-US" sz="4400" b="1" dirty="0">
                 <a:ln w="0"/>
                 <a:solidFill>
                   <a:schemeClr val="tx1"/>
@@ -6606,7 +6571,7 @@
               <a:t> </a:t>
             </a:r>
             <a:r>
-              <a:rPr lang="en-US" sz="4400" b="1" dirty="0" err="1" smtClean="0">
+              <a:rPr lang="en-US" sz="4400" b="1" dirty="0" err="1">
                 <a:ln w="0"/>
                 <a:solidFill>
                   <a:schemeClr val="tx1"/>
@@ -6624,7 +6589,7 @@
               <a:t>Hoa</a:t>
             </a:r>
             <a:r>
-              <a:rPr lang="en-US" sz="4400" b="1" dirty="0" smtClean="0">
+              <a:rPr lang="en-US" sz="4400" b="1" dirty="0">
                 <a:ln w="0"/>
                 <a:solidFill>
                   <a:schemeClr val="tx1"/>
@@ -6645,7 +6610,7 @@
           <a:p>
             <a:pPr lvl="1" algn="just"/>
             <a:r>
-              <a:rPr lang="en-US" sz="4400" b="1" dirty="0" smtClean="0">
+              <a:rPr lang="en-US" sz="4400" b="1" dirty="0">
                 <a:ln w="0"/>
                 <a:solidFill>
                   <a:schemeClr val="tx1"/>
@@ -6695,7 +6660,7 @@
           <a:lstStyle/>
           <a:p>
             <a:r>
-              <a:rPr lang="en-US" sz="2000" b="1" dirty="0" smtClean="0">
+              <a:rPr lang="en-US" sz="2000" b="1" dirty="0">
                 <a:ln>
                   <a:solidFill>
                     <a:schemeClr val="tx1"/>
@@ -6707,7 +6672,7 @@
               <a:t>Teacher: Vo Hong </a:t>
             </a:r>
             <a:r>
-              <a:rPr lang="en-US" sz="2000" b="1" dirty="0" err="1" smtClean="0">
+              <a:rPr lang="en-US" sz="2000" b="1" dirty="0" err="1">
                 <a:ln>
                   <a:solidFill>
                     <a:schemeClr val="tx1"/>
@@ -6783,7 +6748,7 @@
           <a:lstStyle/>
           <a:p>
             <a:r>
-              <a:rPr lang="en-US" sz="3200" b="1" i="1" dirty="0" smtClean="0">
+              <a:rPr lang="en-US" sz="3200" b="1" i="1" dirty="0">
                 <a:solidFill>
                   <a:srgbClr val="FF0000"/>
                 </a:solidFill>
@@ -6792,13 +6757,6 @@
               </a:rPr>
               <a:t>THE DRIFTER</a:t>
             </a:r>
-            <a:endParaRPr lang="en-US" sz="3200" b="1" i="1" dirty="0">
-              <a:solidFill>
-                <a:srgbClr val="FF0000"/>
-              </a:solidFill>
-              <a:latin typeface="Comic Sans MS" panose="030F0702030302020204" pitchFamily="66" charset="0"/>
-              <a:cs typeface="Times New Roman" panose="02020603050405020304" pitchFamily="18" charset="0"/>
-            </a:endParaRPr>
           </a:p>
         </p:txBody>
       </p:sp>
@@ -6815,13 +6773,6 @@
   <p:transition spd="slow">
     <p:push dir="u"/>
   </p:transition>
-  <p:timing>
-    <p:tnLst>
-      <p:par>
-        <p:cTn id="1" dur="indefinite" restart="never" nodeType="tmRoot"/>
-      </p:par>
-    </p:tnLst>
-  </p:timing>
 </p:sld>
 </file>
 
@@ -6924,13 +6875,6 @@
   <p:clrMapOvr>
     <a:masterClrMapping/>
   </p:clrMapOvr>
-  <p:timing>
-    <p:tnLst>
-      <p:par>
-        <p:cTn id="1" dur="indefinite" restart="never" nodeType="tmRoot"/>
-      </p:par>
-    </p:tnLst>
-  </p:timing>
 </p:sld>
 </file>
 
@@ -6975,7 +6919,7 @@
           <a:p>
             <a:pPr algn="ctr"/>
             <a:r>
-              <a:rPr lang="en-US" sz="8000" b="1" i="1" dirty="0" smtClean="0">
+              <a:rPr lang="en-US" sz="8000" b="1" i="1" dirty="0">
                 <a:ln>
                   <a:solidFill>
                     <a:srgbClr val="00B050"/>
@@ -6989,18 +6933,6 @@
               </a:rPr>
               <a:t>Demo</a:t>
             </a:r>
-            <a:endParaRPr lang="en-US" sz="8000" b="1" i="1" dirty="0">
-              <a:ln>
-                <a:solidFill>
-                  <a:srgbClr val="00B050"/>
-                </a:solidFill>
-              </a:ln>
-              <a:solidFill>
-                <a:srgbClr val="92D050"/>
-              </a:solidFill>
-              <a:latin typeface="Times New Roman" panose="02020603050405020304" pitchFamily="18" charset="0"/>
-              <a:cs typeface="Times New Roman" panose="02020603050405020304" pitchFamily="18" charset="0"/>
-            </a:endParaRPr>
           </a:p>
         </p:txBody>
       </p:sp>
@@ -7459,7 +7391,7 @@
               <a:buAutoNum type="romanUcPeriod"/>
             </a:pPr>
             <a:r>
-              <a:rPr lang="en-US" sz="4000" b="1" dirty="0" smtClean="0">
+              <a:rPr lang="en-US" sz="4000" b="1" dirty="0">
                 <a:solidFill>
                   <a:schemeClr val="tx1"/>
                 </a:solidFill>
@@ -7478,7 +7410,7 @@
               <a:buAutoNum type="romanUcPeriod"/>
             </a:pPr>
             <a:r>
-              <a:rPr lang="en-US" sz="4000" b="1" dirty="0" smtClean="0">
+              <a:rPr lang="en-US" sz="4000" b="1" dirty="0">
                 <a:solidFill>
                   <a:schemeClr val="tx1"/>
                 </a:solidFill>
@@ -7497,7 +7429,7 @@
               <a:buAutoNum type="romanUcPeriod"/>
             </a:pPr>
             <a:r>
-              <a:rPr lang="en-US" sz="4000" b="1" dirty="0" smtClean="0">
+              <a:rPr lang="en-US" sz="4000" b="1" dirty="0">
                 <a:solidFill>
                   <a:schemeClr val="tx1"/>
                 </a:solidFill>
@@ -7516,7 +7448,7 @@
               <a:buAutoNum type="romanUcPeriod"/>
             </a:pPr>
             <a:r>
-              <a:rPr lang="en-US" sz="4000" b="1" dirty="0" smtClean="0">
+              <a:rPr lang="en-US" sz="4000" b="1" dirty="0">
                 <a:solidFill>
                   <a:schemeClr val="tx1"/>
                 </a:solidFill>
@@ -7525,13 +7457,6 @@
               </a:rPr>
               <a:t>Demo</a:t>
             </a:r>
-            <a:endParaRPr lang="en-US" sz="4000" b="1" dirty="0">
-              <a:solidFill>
-                <a:schemeClr val="tx1"/>
-              </a:solidFill>
-              <a:latin typeface="Times New Roman" panose="02020603050405020304" pitchFamily="18" charset="0"/>
-              <a:cs typeface="Times New Roman" panose="02020603050405020304" pitchFamily="18" charset="0"/>
-            </a:endParaRPr>
           </a:p>
         </p:txBody>
       </p:sp>
@@ -7913,7 +7838,7 @@
           <a:lstStyle/>
           <a:p>
             <a:r>
-              <a:rPr lang="en-US" sz="4000" b="1" dirty="0" smtClean="0">
+              <a:rPr lang="en-US" sz="4000" b="1" dirty="0">
                 <a:ln>
                   <a:solidFill>
                     <a:srgbClr val="00B050"/>
@@ -7927,18 +7852,6 @@
               </a:rPr>
               <a:t>Problem definition</a:t>
             </a:r>
-            <a:endParaRPr lang="en-US" sz="4000" b="1" dirty="0">
-              <a:ln>
-                <a:solidFill>
-                  <a:srgbClr val="00B050"/>
-                </a:solidFill>
-              </a:ln>
-              <a:solidFill>
-                <a:srgbClr val="92D050"/>
-              </a:solidFill>
-              <a:latin typeface="Times New Roman" panose="02020603050405020304" pitchFamily="18" charset="0"/>
-              <a:cs typeface="Times New Roman" panose="02020603050405020304" pitchFamily="18" charset="0"/>
-            </a:endParaRPr>
           </a:p>
         </p:txBody>
       </p:sp>
@@ -7979,17 +7892,7 @@
                 <a:latin typeface="Times New Roman" panose="02020603050405020304" pitchFamily="18" charset="0"/>
                 <a:cs typeface="Times New Roman" panose="02020603050405020304" pitchFamily="18" charset="0"/>
               </a:rPr>
-              <a:t>There is a customer named 'A', he is very headache when facing with lots of bills and books every day. While other stores all use software to manage the store, Mr. A still manages the store in a traditional fashion every day. Mr. A wanted to build a store management software for his shop, so he went to meet the programmers to order</a:t>
-            </a:r>
-            <a:r>
-              <a:rPr lang="en-US" sz="2400" b="1" dirty="0" smtClean="0">
-                <a:solidFill>
-                  <a:sysClr val="windowText" lastClr="000000"/>
-                </a:solidFill>
-                <a:latin typeface="Times New Roman" panose="02020603050405020304" pitchFamily="18" charset="0"/>
-                <a:cs typeface="Times New Roman" panose="02020603050405020304" pitchFamily="18" charset="0"/>
-              </a:rPr>
-              <a:t>.</a:t>
+              <a:t>There is a customer named 'A', he is very headache when facing with lots of bills and books every day. While other stores all use software to manage the store, Mr. A still manages the store in a traditional fashion every day. Mr. A wanted to build a store management software for his shop, so he went to meet the programmers to order.</a:t>
             </a:r>
           </a:p>
           <a:p>
@@ -8001,32 +7904,15 @@
               <a:buChar char="v"/>
             </a:pPr>
             <a:r>
-              <a:rPr lang="en-US" sz="2400" b="1" dirty="0" smtClean="0">
+              <a:rPr lang="en-US" sz="2400" b="1" dirty="0">
                 <a:solidFill>
                   <a:sysClr val="windowText" lastClr="000000"/>
                 </a:solidFill>
                 <a:latin typeface="Times New Roman" panose="02020603050405020304" pitchFamily="18" charset="0"/>
                 <a:cs typeface="Times New Roman" panose="02020603050405020304" pitchFamily="18" charset="0"/>
               </a:rPr>
-              <a:t> </a:t>
-            </a:r>
-            <a:r>
-              <a:rPr lang="en-US" sz="2400" b="1" dirty="0">
-                <a:solidFill>
-                  <a:sysClr val="windowText" lastClr="000000"/>
-                </a:solidFill>
-                <a:latin typeface="Times New Roman" panose="02020603050405020304" pitchFamily="18" charset="0"/>
-                <a:cs typeface="Times New Roman" panose="02020603050405020304" pitchFamily="18" charset="0"/>
-              </a:rPr>
-              <a:t>Programmers introduced Mr. A to the benefits of using management programs compared to traditional-style management. </a:t>
-            </a:r>
-            <a:endParaRPr lang="en-US" sz="2400" b="1" dirty="0" smtClean="0">
-              <a:solidFill>
-                <a:sysClr val="windowText" lastClr="000000"/>
-              </a:solidFill>
-              <a:latin typeface="Times New Roman" panose="02020603050405020304" pitchFamily="18" charset="0"/>
-              <a:cs typeface="Times New Roman" panose="02020603050405020304" pitchFamily="18" charset="0"/>
-            </a:endParaRPr>
+              <a:t> Programmers introduced Mr. A to the benefits of using management programs compared to traditional-style management. </a:t>
+            </a:r>
           </a:p>
         </p:txBody>
       </p:sp>
@@ -8332,18 +8218,11 @@
               <a:buChar char="v"/>
             </a:pPr>
             <a:r>
-              <a:rPr lang="en-US" sz="3200" b="1" dirty="0" smtClean="0">
-                <a:latin typeface="Times New Roman" panose="02020603050405020304" pitchFamily="18" charset="0"/>
-                <a:cs typeface="Times New Roman" panose="02020603050405020304" pitchFamily="18" charset="0"/>
-              </a:rPr>
-              <a:t>Advantages </a:t>
-            </a:r>
-            <a:r>
               <a:rPr lang="en-US" sz="3200" b="1" dirty="0">
                 <a:latin typeface="Times New Roman" panose="02020603050405020304" pitchFamily="18" charset="0"/>
                 <a:cs typeface="Times New Roman" panose="02020603050405020304" pitchFamily="18" charset="0"/>
               </a:rPr>
-              <a:t>when using management program: </a:t>
+              <a:t>Advantages when using management program: </a:t>
             </a:r>
           </a:p>
           <a:p>
@@ -8361,10 +8240,6 @@
               </a:rPr>
               <a:t>Save time and cost </a:t>
             </a:r>
-            <a:endParaRPr lang="en-US" sz="2400" b="1" dirty="0" smtClean="0">
-              <a:latin typeface="Times New Roman" panose="02020603050405020304" pitchFamily="18" charset="0"/>
-              <a:cs typeface="Times New Roman" panose="02020603050405020304" pitchFamily="18" charset="0"/>
-            </a:endParaRPr>
           </a:p>
           <a:p>
             <a:pPr marL="800100" lvl="1" indent="-342900" algn="just">
@@ -8375,18 +8250,11 @@
               <a:buChar char="§"/>
             </a:pPr>
             <a:r>
-              <a:rPr lang="en-US" sz="2400" b="1" dirty="0" smtClean="0">
-                <a:latin typeface="Times New Roman" panose="02020603050405020304" pitchFamily="18" charset="0"/>
-                <a:cs typeface="Times New Roman" panose="02020603050405020304" pitchFamily="18" charset="0"/>
-              </a:rPr>
-              <a:t>Effectively </a:t>
-            </a:r>
-            <a:r>
               <a:rPr lang="en-US" sz="2400" b="1" dirty="0">
                 <a:latin typeface="Times New Roman" panose="02020603050405020304" pitchFamily="18" charset="0"/>
                 <a:cs typeface="Times New Roman" panose="02020603050405020304" pitchFamily="18" charset="0"/>
               </a:rPr>
-              <a:t>manage resources.</a:t>
+              <a:t>Effectively manage resources.</a:t>
             </a:r>
           </a:p>
           <a:p>
@@ -9372,7 +9240,7 @@
           <a:lstStyle/>
           <a:p>
             <a:r>
-              <a:rPr lang="en-US" sz="4000" b="1" dirty="0" smtClean="0">
+              <a:rPr lang="en-US" sz="4000" b="1" dirty="0">
                 <a:ln>
                   <a:solidFill>
                     <a:srgbClr val="00B050"/>
@@ -9386,18 +9254,6 @@
               </a:rPr>
               <a:t>Hardware requirement</a:t>
             </a:r>
-            <a:endParaRPr lang="en-US" sz="4000" b="1" dirty="0">
-              <a:ln>
-                <a:solidFill>
-                  <a:srgbClr val="00B050"/>
-                </a:solidFill>
-              </a:ln>
-              <a:solidFill>
-                <a:srgbClr val="92D050"/>
-              </a:solidFill>
-              <a:latin typeface="Times New Roman" panose="02020603050405020304" pitchFamily="18" charset="0"/>
-              <a:cs typeface="Times New Roman" panose="02020603050405020304" pitchFamily="18" charset="0"/>
-            </a:endParaRPr>
           </a:p>
         </p:txBody>
       </p:sp>
@@ -9413,13 +9269,13 @@
         </p:nvSpPr>
         <p:spPr>
           <a:xfrm>
-            <a:off x="1874468" y="1578428"/>
-            <a:ext cx="4739051" cy="4201886"/>
+            <a:off x="1874467" y="1578428"/>
+            <a:ext cx="5691455" cy="4201886"/>
           </a:xfrm>
         </p:spPr>
         <p:txBody>
           <a:bodyPr>
-            <a:normAutofit fontScale="92500"/>
+            <a:normAutofit/>
           </a:bodyPr>
           <a:lstStyle/>
           <a:p>
@@ -9429,7 +9285,7 @@
               </a:buClr>
             </a:pPr>
             <a:r>
-              <a:rPr lang="en-US" sz="2800" b="1" dirty="0" smtClean="0">
+              <a:rPr lang="en-US" sz="2800" b="1" dirty="0">
                 <a:solidFill>
                   <a:sysClr val="windowText" lastClr="000000"/>
                 </a:solidFill>
@@ -9448,24 +9304,14 @@
               <a:buChar char="•"/>
             </a:pPr>
             <a:r>
-              <a:rPr lang="en-US" sz="2400" b="1" dirty="0" smtClean="0">
+              <a:rPr lang="en-US" sz="2400" b="1" dirty="0">
                 <a:solidFill>
                   <a:sysClr val="windowText" lastClr="000000"/>
                 </a:solidFill>
                 <a:latin typeface="Times New Roman" panose="02020603050405020304" pitchFamily="18" charset="0"/>
                 <a:cs typeface="Times New Roman" panose="02020603050405020304" pitchFamily="18" charset="0"/>
               </a:rPr>
-              <a:t>CPU: Intel </a:t>
-            </a:r>
-            <a:r>
-              <a:rPr lang="en-US" sz="2400" b="1" dirty="0">
-                <a:solidFill>
-                  <a:sysClr val="windowText" lastClr="000000"/>
-                </a:solidFill>
-                <a:latin typeface="Times New Roman" panose="02020603050405020304" pitchFamily="18" charset="0"/>
-                <a:cs typeface="Times New Roman" panose="02020603050405020304" pitchFamily="18" charset="0"/>
-              </a:rPr>
-              <a:t>Core i5 4</a:t>
+              <a:t>CPU: Intel Core i5 4</a:t>
             </a:r>
             <a:r>
               <a:rPr lang="en-US" sz="2400" b="1" baseline="30000" dirty="0">
@@ -9485,17 +9331,7 @@
                 <a:latin typeface="Times New Roman" panose="02020603050405020304" pitchFamily="18" charset="0"/>
                 <a:cs typeface="Times New Roman" panose="02020603050405020304" pitchFamily="18" charset="0"/>
               </a:rPr>
-              <a:t> Gen or </a:t>
-            </a:r>
-            <a:r>
-              <a:rPr lang="en-US" sz="2400" b="1" dirty="0" smtClean="0">
-                <a:solidFill>
-                  <a:sysClr val="windowText" lastClr="000000"/>
-                </a:solidFill>
-                <a:latin typeface="Times New Roman" panose="02020603050405020304" pitchFamily="18" charset="0"/>
-                <a:cs typeface="Times New Roman" panose="02020603050405020304" pitchFamily="18" charset="0"/>
-              </a:rPr>
-              <a:t>higher</a:t>
+              <a:t> Gen or higher</a:t>
             </a:r>
           </a:p>
           <a:p>
@@ -9507,7 +9343,7 @@
               <a:buChar char="•"/>
             </a:pPr>
             <a:r>
-              <a:rPr lang="en-US" sz="2400" b="1" dirty="0" smtClean="0">
+              <a:rPr lang="en-US" sz="2400" b="1" dirty="0">
                 <a:solidFill>
                   <a:sysClr val="windowText" lastClr="000000"/>
                 </a:solidFill>
@@ -9526,15 +9362,32 @@
               <a:buChar char="•"/>
             </a:pPr>
             <a:r>
-              <a:rPr lang="en-US" sz="2400" b="1" dirty="0" smtClean="0">
+              <a:rPr lang="en-US" sz="2400" b="1" dirty="0">
                 <a:solidFill>
                   <a:sysClr val="windowText" lastClr="000000"/>
                 </a:solidFill>
                 <a:latin typeface="Times New Roman" panose="02020603050405020304" pitchFamily="18" charset="0"/>
                 <a:cs typeface="Times New Roman" panose="02020603050405020304" pitchFamily="18" charset="0"/>
               </a:rPr>
-              <a:t>HDD: 10GB</a:t>
-            </a:r>
+              <a:t>HDD: 10GB </a:t>
+            </a:r>
+            <a:r>
+              <a:rPr lang="en-US" sz="2400" b="1">
+                <a:solidFill>
+                  <a:sysClr val="windowText" lastClr="000000"/>
+                </a:solidFill>
+                <a:latin typeface="Times New Roman" panose="02020603050405020304" pitchFamily="18" charset="0"/>
+                <a:cs typeface="Times New Roman" panose="02020603050405020304" pitchFamily="18" charset="0"/>
+              </a:rPr>
+              <a:t>disk free</a:t>
+            </a:r>
+            <a:endParaRPr lang="en-US" sz="2400" b="1" dirty="0">
+              <a:solidFill>
+                <a:sysClr val="windowText" lastClr="000000"/>
+              </a:solidFill>
+              <a:latin typeface="Times New Roman" panose="02020603050405020304" pitchFamily="18" charset="0"/>
+              <a:cs typeface="Times New Roman" panose="02020603050405020304" pitchFamily="18" charset="0"/>
+            </a:endParaRPr>
           </a:p>
           <a:p>
             <a:pPr>
@@ -9543,7 +9396,7 @@
               </a:buClr>
             </a:pPr>
             <a:r>
-              <a:rPr lang="en-US" sz="2800" b="1" dirty="0" smtClean="0">
+              <a:rPr lang="en-US" sz="2800" b="1" dirty="0">
                 <a:solidFill>
                   <a:sysClr val="windowText" lastClr="000000"/>
                 </a:solidFill>
@@ -9562,7 +9415,7 @@
               <a:buChar char="•"/>
             </a:pPr>
             <a:r>
-              <a:rPr lang="en-US" sz="2200" b="1" dirty="0" smtClean="0">
+              <a:rPr lang="en-US" sz="2400" b="1" dirty="0">
                 <a:solidFill>
                   <a:sysClr val="windowText" lastClr="000000"/>
                 </a:solidFill>
@@ -9581,7 +9434,7 @@
               <a:buChar char="•"/>
             </a:pPr>
             <a:r>
-              <a:rPr lang="en-US" sz="2200" b="1" dirty="0" smtClean="0">
+              <a:rPr lang="en-US" sz="2400" b="1" dirty="0">
                 <a:solidFill>
                   <a:sysClr val="windowText" lastClr="000000"/>
                 </a:solidFill>
@@ -9600,7 +9453,7 @@
               <a:buChar char="•"/>
             </a:pPr>
             <a:r>
-              <a:rPr lang="en-US" sz="2200" b="1" dirty="0" smtClean="0">
+              <a:rPr lang="en-US" sz="2400" b="1" dirty="0">
                 <a:solidFill>
                   <a:sysClr val="windowText" lastClr="000000"/>
                 </a:solidFill>
@@ -10597,7 +10450,7 @@
           <a:lstStyle/>
           <a:p>
             <a:r>
-              <a:rPr lang="en-US" sz="4000" b="1" dirty="0" smtClean="0">
+              <a:rPr lang="en-US" sz="4000" b="1" dirty="0">
                 <a:ln>
                   <a:solidFill>
                     <a:srgbClr val="00B050"/>
@@ -10611,18 +10464,6 @@
               </a:rPr>
               <a:t>Software requirement</a:t>
             </a:r>
-            <a:endParaRPr lang="en-US" sz="4000" b="1" dirty="0">
-              <a:ln>
-                <a:solidFill>
-                  <a:srgbClr val="00B050"/>
-                </a:solidFill>
-              </a:ln>
-              <a:solidFill>
-                <a:srgbClr val="92D050"/>
-              </a:solidFill>
-              <a:latin typeface="Times New Roman" panose="02020603050405020304" pitchFamily="18" charset="0"/>
-              <a:cs typeface="Times New Roman" panose="02020603050405020304" pitchFamily="18" charset="0"/>
-            </a:endParaRPr>
           </a:p>
         </p:txBody>
       </p:sp>
@@ -10652,7 +10493,7 @@
               </a:buClr>
             </a:pPr>
             <a:r>
-              <a:rPr lang="en-US" sz="2800" b="1" dirty="0" smtClean="0">
+              <a:rPr lang="en-US" sz="2800" b="1" dirty="0">
                 <a:solidFill>
                   <a:sysClr val="windowText" lastClr="000000"/>
                 </a:solidFill>
@@ -10671,7 +10512,7 @@
               <a:buChar char="•"/>
             </a:pPr>
             <a:r>
-              <a:rPr lang="en-US" sz="2400" b="1" dirty="0" smtClean="0">
+              <a:rPr lang="en-US" sz="2400" b="1" dirty="0">
                 <a:solidFill>
                   <a:sysClr val="windowText" lastClr="000000"/>
                 </a:solidFill>
@@ -10690,7 +10531,7 @@
               <a:buChar char="•"/>
             </a:pPr>
             <a:r>
-              <a:rPr lang="en-US" sz="2400" b="1" dirty="0" smtClean="0">
+              <a:rPr lang="en-US" sz="2400" b="1" dirty="0">
                 <a:solidFill>
                   <a:sysClr val="windowText" lastClr="000000"/>
                 </a:solidFill>
@@ -10707,7 +10548,7 @@
               </a:buClr>
             </a:pPr>
             <a:r>
-              <a:rPr lang="en-US" sz="2800" b="1" dirty="0" smtClean="0">
+              <a:rPr lang="en-US" sz="2800" b="1" dirty="0">
                 <a:solidFill>
                   <a:sysClr val="windowText" lastClr="000000"/>
                 </a:solidFill>
@@ -10733,17 +10574,7 @@
                 <a:latin typeface="Times New Roman" panose="02020603050405020304" pitchFamily="18" charset="0"/>
                 <a:cs typeface="Times New Roman" panose="02020603050405020304" pitchFamily="18" charset="0"/>
               </a:rPr>
-              <a:t>OS: </a:t>
-            </a:r>
-            <a:r>
-              <a:rPr lang="en-US" sz="2400" b="1" dirty="0" smtClean="0">
-                <a:solidFill>
-                  <a:sysClr val="windowText" lastClr="000000"/>
-                </a:solidFill>
-                <a:latin typeface="Times New Roman" panose="02020603050405020304" pitchFamily="18" charset="0"/>
-                <a:cs typeface="Times New Roman" panose="02020603050405020304" pitchFamily="18" charset="0"/>
-              </a:rPr>
-              <a:t>Windows Server 2008 or higher</a:t>
+              <a:t>OS: Windows Server 2008 or higher</a:t>
             </a:r>
           </a:p>
           <a:p>
@@ -10755,7 +10586,7 @@
               <a:buChar char="•"/>
             </a:pPr>
             <a:r>
-              <a:rPr lang="en-US" sz="2400" b="1" dirty="0" smtClean="0">
+              <a:rPr lang="en-US" sz="2400" b="1" dirty="0">
                 <a:solidFill>
                   <a:sysClr val="windowText" lastClr="000000"/>
                 </a:solidFill>
@@ -10770,7 +10601,7 @@
               <a:buFont typeface="Arial" panose="020B0604020202020204" pitchFamily="34" charset="0"/>
               <a:buChar char="•"/>
             </a:pPr>
-            <a:endParaRPr lang="en-US" sz="2000" b="1" dirty="0" smtClean="0">
+            <a:endParaRPr lang="en-US" sz="2000" b="1" dirty="0">
               <a:latin typeface="Times New Roman" panose="02020603050405020304" pitchFamily="18" charset="0"/>
               <a:cs typeface="Times New Roman" panose="02020603050405020304" pitchFamily="18" charset="0"/>
             </a:endParaRPr>
@@ -11639,7 +11470,7 @@
               <a:buChar char="Ø"/>
             </a:pPr>
             <a:r>
-              <a:rPr lang="en-US" sz="2600" b="1" dirty="0" smtClean="0">
+              <a:rPr lang="en-US" sz="2600" b="1" dirty="0">
                 <a:solidFill>
                   <a:schemeClr val="tx1"/>
                 </a:solidFill>
@@ -11669,7 +11500,7 @@
               <a:t>	</a:t>
             </a:r>
             <a:r>
-              <a:rPr lang="en-US" sz="2000" b="1" dirty="0" smtClean="0">
+              <a:rPr lang="en-US" sz="2000" b="1" dirty="0">
                 <a:solidFill>
                   <a:schemeClr val="tx1"/>
                 </a:solidFill>
@@ -11685,7 +11516,7 @@
               <a:buChar char="Ø"/>
             </a:pPr>
             <a:r>
-              <a:rPr lang="en-US" sz="2600" b="1" dirty="0" smtClean="0">
+              <a:rPr lang="en-US" sz="2600" b="1" dirty="0">
                 <a:solidFill>
                   <a:schemeClr val="tx1"/>
                 </a:solidFill>
@@ -11700,7 +11531,7 @@
               <a:buNone/>
             </a:pPr>
             <a:r>
-              <a:rPr lang="en-US" sz="1800" b="1" dirty="0" smtClean="0">
+              <a:rPr lang="en-US" sz="1800" b="1" dirty="0">
                 <a:ln>
                   <a:solidFill>
                     <a:schemeClr val="tx1"/>
@@ -11715,7 +11546,7 @@
               <a:t>	</a:t>
             </a:r>
             <a:r>
-              <a:rPr lang="en-US" sz="2000" b="1" dirty="0" smtClean="0">
+              <a:rPr lang="en-US" sz="2000" b="1" dirty="0">
                 <a:solidFill>
                   <a:schemeClr val="tx1"/>
                 </a:solidFill>
@@ -11731,7 +11562,7 @@
               <a:buChar char="Ø"/>
             </a:pPr>
             <a:r>
-              <a:rPr lang="en-US" sz="2600" b="1" dirty="0" smtClean="0">
+              <a:rPr lang="en-US" sz="2600" b="1" dirty="0">
                 <a:solidFill>
                   <a:schemeClr val="tx1"/>
                 </a:solidFill>
@@ -11746,34 +11577,14 @@
               <a:buNone/>
             </a:pPr>
             <a:r>
-              <a:rPr lang="en-US" sz="2000" b="1" dirty="0" smtClean="0">
+              <a:rPr lang="en-US" sz="2000" b="1" dirty="0">
                 <a:solidFill>
                   <a:schemeClr val="tx1"/>
                 </a:solidFill>
                 <a:latin typeface="Times New Roman" panose="02020603050405020304" pitchFamily="18" charset="0"/>
                 <a:cs typeface="Times New Roman" panose="02020603050405020304" pitchFamily="18" charset="0"/>
               </a:rPr>
-              <a:t>Input Customer </a:t>
-            </a:r>
-            <a:r>
-              <a:rPr lang="en-US" sz="2000" b="1" dirty="0">
-                <a:solidFill>
-                  <a:schemeClr val="tx1"/>
-                </a:solidFill>
-                <a:latin typeface="Times New Roman" panose="02020603050405020304" pitchFamily="18" charset="0"/>
-                <a:cs typeface="Times New Roman" panose="02020603050405020304" pitchFamily="18" charset="0"/>
-              </a:rPr>
-              <a:t>, employee, product  </a:t>
-            </a:r>
-            <a:r>
-              <a:rPr lang="en-US" sz="2000" b="1" dirty="0" smtClean="0">
-                <a:solidFill>
-                  <a:schemeClr val="tx1"/>
-                </a:solidFill>
-                <a:latin typeface="Times New Roman" panose="02020603050405020304" pitchFamily="18" charset="0"/>
-                <a:cs typeface="Times New Roman" panose="02020603050405020304" pitchFamily="18" charset="0"/>
-              </a:rPr>
-              <a:t>information</a:t>
+              <a:t>Input Customer , employee, product  information</a:t>
             </a:r>
           </a:p>
           <a:p>
@@ -11781,7 +11592,7 @@
               <a:buNone/>
             </a:pPr>
             <a:r>
-              <a:rPr lang="en-US" sz="2000" b="1" dirty="0" smtClean="0">
+              <a:rPr lang="en-US" sz="2000" b="1" dirty="0">
                 <a:solidFill>
                   <a:schemeClr val="tx1"/>
                 </a:solidFill>
@@ -11796,7 +11607,7 @@
               <a:buNone/>
             </a:pPr>
             <a:r>
-              <a:rPr lang="en-US" sz="2000" b="1" dirty="0" smtClean="0">
+              <a:rPr lang="en-US" sz="2000" b="1" dirty="0">
                 <a:solidFill>
                   <a:schemeClr val="tx1"/>
                 </a:solidFill>
@@ -12933,7 +12744,7 @@
           <a:p>
             <a:pPr algn="ctr"/>
             <a:r>
-              <a:rPr lang="en-US" b="1" dirty="0" smtClean="0">
+              <a:rPr lang="en-US" b="1" dirty="0">
                 <a:ln>
                   <a:solidFill>
                     <a:srgbClr val="00B050"/>
@@ -12947,18 +12758,6 @@
               </a:rPr>
               <a:t>Database Diagram</a:t>
             </a:r>
-            <a:endParaRPr lang="en-US" b="1" dirty="0">
-              <a:ln>
-                <a:solidFill>
-                  <a:srgbClr val="00B050"/>
-                </a:solidFill>
-              </a:ln>
-              <a:solidFill>
-                <a:srgbClr val="92D050"/>
-              </a:solidFill>
-              <a:latin typeface="Times New Roman" panose="02020603050405020304" pitchFamily="18" charset="0"/>
-              <a:cs typeface="Times New Roman" panose="02020603050405020304" pitchFamily="18" charset="0"/>
-            </a:endParaRPr>
           </a:p>
         </p:txBody>
       </p:sp>
@@ -13033,7 +12832,7 @@
               <a:tabLst/>
             </a:pPr>
             <a:r>
-              <a:rPr kumimoji="0" lang="en-US" altLang="en-US" sz="1100" b="0" i="0" u="none" strike="noStrike" cap="none" normalizeH="0" baseline="0" dirty="0" smtClean="0">
+              <a:rPr kumimoji="0" lang="en-US" altLang="en-US" sz="1100" b="0" i="0" u="none" strike="noStrike" cap="none" normalizeH="0" baseline="0" dirty="0">
                 <a:ln>
                   <a:noFill/>
                 </a:ln>
@@ -13044,7 +12843,7 @@
               </a:rPr>
               <a:t> </a:t>
             </a:r>
-            <a:endParaRPr kumimoji="0" lang="en-US" altLang="en-US" sz="1800" b="0" i="0" u="none" strike="noStrike" cap="none" normalizeH="0" baseline="0" dirty="0" smtClean="0">
+            <a:endParaRPr kumimoji="0" lang="en-US" altLang="en-US" sz="1800" b="0" i="0" u="none" strike="noStrike" cap="none" normalizeH="0" baseline="0" dirty="0">
               <a:ln>
                 <a:noFill/>
               </a:ln>
@@ -13399,7 +13198,7 @@
           <a:lstStyle/>
           <a:p>
             <a:r>
-              <a:rPr lang="en-US" b="1" dirty="0" smtClean="0">
+              <a:rPr lang="en-US" b="1" dirty="0">
                 <a:ln>
                   <a:solidFill>
                     <a:srgbClr val="00B050"/>
@@ -13410,15 +13209,6 @@
               </a:rPr>
               <a:t>Class diagram</a:t>
             </a:r>
-            <a:endParaRPr lang="en-US" b="1" dirty="0">
-              <a:ln>
-                <a:solidFill>
-                  <a:srgbClr val="00B050"/>
-                </a:solidFill>
-              </a:ln>
-              <a:latin typeface="Times New Roman" panose="02020603050405020304" pitchFamily="18" charset="0"/>
-              <a:cs typeface="Times New Roman" panose="02020603050405020304" pitchFamily="18" charset="0"/>
-            </a:endParaRPr>
           </a:p>
         </p:txBody>
       </p:sp>
@@ -13486,13 +13276,6 @@
   <p:clrMapOvr>
     <a:masterClrMapping/>
   </p:clrMapOvr>
-  <p:timing>
-    <p:tnLst>
-      <p:par>
-        <p:cTn id="1" dur="indefinite" restart="never" nodeType="tmRoot"/>
-      </p:par>
-    </p:tnLst>
-  </p:timing>
 </p:sld>
 </file>
 

</xml_diff>